<commit_message>
Update Design of Critically Coupled Microring Resonators.pptx
</commit_message>
<xml_diff>
--- a/SiEPIC_Photonics_Package/solvers_simulators/rings/Design of Critically Coupled Microring Resonators.pptx
+++ b/SiEPIC_Photonics_Package/solvers_simulators/rings/Design of Critically Coupled Microring Resonators.pptx
@@ -108,6 +108,11 @@
       </a:defRPr>
     </a:lvl9pPr>
   </p:defaultTextStyle>
+  <p:extLst>
+    <p:ext uri="{EFAFB233-063F-42B5-8137-9DF3F51BA10A}">
+      <p15:sldGuideLst xmlns:p15="http://schemas.microsoft.com/office/powerpoint/2012/main"/>
+    </p:ext>
+  </p:extLst>
 </p:presentation>
 </file>
 
@@ -337,7 +342,7 @@
           <a:p>
             <a:fld id="{FADC9871-791D-4886-AEB8-61B2D1DCF1D4}" type="datetimeFigureOut">
               <a:rPr lang="en-US" smtClean="0"/>
-              <a:t>9/4/2020</a:t>
+              <a:t>9/5/2020</a:t>
             </a:fld>
             <a:endParaRPr lang="en-US"/>
           </a:p>
@@ -545,7 +550,7 @@
           <a:p>
             <a:fld id="{FADC9871-791D-4886-AEB8-61B2D1DCF1D4}" type="datetimeFigureOut">
               <a:rPr lang="en-US" smtClean="0"/>
-              <a:t>9/4/2020</a:t>
+              <a:t>9/5/2020</a:t>
             </a:fld>
             <a:endParaRPr lang="en-US"/>
           </a:p>
@@ -801,7 +806,7 @@
           <a:p>
             <a:fld id="{FADC9871-791D-4886-AEB8-61B2D1DCF1D4}" type="datetimeFigureOut">
               <a:rPr lang="en-US" smtClean="0"/>
-              <a:t>9/4/2020</a:t>
+              <a:t>9/5/2020</a:t>
             </a:fld>
             <a:endParaRPr lang="en-US"/>
           </a:p>
@@ -971,7 +976,7 @@
           <a:p>
             <a:fld id="{FADC9871-791D-4886-AEB8-61B2D1DCF1D4}" type="datetimeFigureOut">
               <a:rPr lang="en-US" smtClean="0"/>
-              <a:t>9/4/2020</a:t>
+              <a:t>9/5/2020</a:t>
             </a:fld>
             <a:endParaRPr lang="en-US"/>
           </a:p>
@@ -1314,7 +1319,7 @@
           <a:p>
             <a:fld id="{FADC9871-791D-4886-AEB8-61B2D1DCF1D4}" type="datetimeFigureOut">
               <a:rPr lang="en-US" smtClean="0"/>
-              <a:t>9/4/2020</a:t>
+              <a:t>9/5/2020</a:t>
             </a:fld>
             <a:endParaRPr lang="en-US"/>
           </a:p>
@@ -1589,7 +1594,7 @@
           <a:p>
             <a:fld id="{FADC9871-791D-4886-AEB8-61B2D1DCF1D4}" type="datetimeFigureOut">
               <a:rPr lang="en-US" smtClean="0"/>
-              <a:t>9/4/2020</a:t>
+              <a:t>9/5/2020</a:t>
             </a:fld>
             <a:endParaRPr lang="en-US"/>
           </a:p>
@@ -1968,7 +1973,7 @@
           <a:p>
             <a:fld id="{FADC9871-791D-4886-AEB8-61B2D1DCF1D4}" type="datetimeFigureOut">
               <a:rPr lang="en-US" smtClean="0"/>
-              <a:t>9/4/2020</a:t>
+              <a:t>9/5/2020</a:t>
             </a:fld>
             <a:endParaRPr lang="en-US"/>
           </a:p>
@@ -2086,7 +2091,7 @@
           <a:p>
             <a:fld id="{FADC9871-791D-4886-AEB8-61B2D1DCF1D4}" type="datetimeFigureOut">
               <a:rPr lang="en-US" smtClean="0"/>
-              <a:t>9/4/2020</a:t>
+              <a:t>9/5/2020</a:t>
             </a:fld>
             <a:endParaRPr lang="en-US"/>
           </a:p>
@@ -2257,7 +2262,7 @@
           <a:p>
             <a:fld id="{FADC9871-791D-4886-AEB8-61B2D1DCF1D4}" type="datetimeFigureOut">
               <a:rPr lang="en-US" smtClean="0"/>
-              <a:t>9/4/2020</a:t>
+              <a:t>9/5/2020</a:t>
             </a:fld>
             <a:endParaRPr lang="en-US"/>
           </a:p>
@@ -2611,7 +2616,7 @@
           <a:p>
             <a:fld id="{FADC9871-791D-4886-AEB8-61B2D1DCF1D4}" type="datetimeFigureOut">
               <a:rPr lang="en-US" smtClean="0"/>
-              <a:t>9/4/2020</a:t>
+              <a:t>9/5/2020</a:t>
             </a:fld>
             <a:endParaRPr lang="en-US"/>
           </a:p>
@@ -2988,7 +2993,7 @@
           <a:p>
             <a:fld id="{FADC9871-791D-4886-AEB8-61B2D1DCF1D4}" type="datetimeFigureOut">
               <a:rPr lang="en-US" smtClean="0"/>
-              <a:t>9/4/2020</a:t>
+              <a:t>9/5/2020</a:t>
             </a:fld>
             <a:endParaRPr lang="en-US"/>
           </a:p>
@@ -3275,7 +3280,7 @@
           <a:p>
             <a:fld id="{FADC9871-791D-4886-AEB8-61B2D1DCF1D4}" type="datetimeFigureOut">
               <a:rPr lang="en-US" smtClean="0"/>
-              <a:t>9/4/2020</a:t>
+              <a:t>9/5/2020</a:t>
             </a:fld>
             <a:endParaRPr lang="en-US"/>
           </a:p>
@@ -4223,8 +4228,8 @@
           </a:fontRef>
         </p:style>
       </p:cxnSp>
-      <mc:AlternateContent xmlns:mc="http://schemas.openxmlformats.org/markup-compatibility/2006">
-        <mc:Choice xmlns:a14="http://schemas.microsoft.com/office/drawing/2010/main" Requires="a14">
+      <mc:AlternateContent xmlns:mc="http://schemas.openxmlformats.org/markup-compatibility/2006" xmlns:a14="http://schemas.microsoft.com/office/drawing/2010/main">
+        <mc:Choice Requires="a14">
           <p:sp>
             <p:nvSpPr>
               <p:cNvPr id="23" name="TextBox 22">
@@ -4253,6 +4258,7 @@
               </a:bodyPr>
               <a:lstStyle/>
               <a:p>
+                <a:pPr/>
                 <a14:m>
                   <m:oMathPara xmlns:m="http://schemas.openxmlformats.org/officeDocument/2006/math">
                     <m:oMathParaPr>
@@ -4273,7 +4279,7 @@
             </p:txBody>
           </p:sp>
         </mc:Choice>
-        <mc:Fallback>
+        <mc:Fallback xmlns="">
           <p:sp>
             <p:nvSpPr>
               <p:cNvPr id="23" name="TextBox 22">
@@ -4494,8 +4500,8 @@
           </a:fontRef>
         </p:style>
       </p:cxnSp>
-      <mc:AlternateContent xmlns:mc="http://schemas.openxmlformats.org/markup-compatibility/2006">
-        <mc:Choice xmlns:a14="http://schemas.microsoft.com/office/drawing/2010/main" Requires="a14">
+      <mc:AlternateContent xmlns:mc="http://schemas.openxmlformats.org/markup-compatibility/2006" xmlns:a14="http://schemas.microsoft.com/office/drawing/2010/main">
+        <mc:Choice Requires="a14">
           <p:sp>
             <p:nvSpPr>
               <p:cNvPr id="31" name="TextBox 30">
@@ -4524,6 +4530,7 @@
               </a:bodyPr>
               <a:lstStyle/>
               <a:p>
+                <a:pPr/>
                 <a14:m>
                   <m:oMathPara xmlns:m="http://schemas.openxmlformats.org/officeDocument/2006/math">
                     <m:oMathParaPr>
@@ -4544,7 +4551,7 @@
             </p:txBody>
           </p:sp>
         </mc:Choice>
-        <mc:Fallback>
+        <mc:Fallback xmlns="">
           <p:sp>
             <p:nvSpPr>
               <p:cNvPr id="31" name="TextBox 30">
@@ -4796,8 +4803,8 @@
           </a:fontRef>
         </p:style>
       </p:cxnSp>
-      <mc:AlternateContent xmlns:mc="http://schemas.openxmlformats.org/markup-compatibility/2006">
-        <mc:Choice xmlns:a14="http://schemas.microsoft.com/office/drawing/2010/main" Requires="a14">
+      <mc:AlternateContent xmlns:mc="http://schemas.openxmlformats.org/markup-compatibility/2006" xmlns:a14="http://schemas.microsoft.com/office/drawing/2010/main">
+        <mc:Choice Requires="a14">
           <p:sp>
             <p:nvSpPr>
               <p:cNvPr id="22" name="TextBox 21">
@@ -4826,6 +4833,7 @@
               </a:bodyPr>
               <a:lstStyle/>
               <a:p>
+                <a:pPr/>
                 <a14:m>
                   <m:oMathPara xmlns:m="http://schemas.openxmlformats.org/officeDocument/2006/math">
                     <m:oMathParaPr>
@@ -4865,7 +4873,7 @@
             </p:txBody>
           </p:sp>
         </mc:Choice>
-        <mc:Fallback>
+        <mc:Fallback xmlns="">
           <p:sp>
             <p:nvSpPr>
               <p:cNvPr id="22" name="TextBox 21">
@@ -4910,8 +4918,8 @@
           </p:sp>
         </mc:Fallback>
       </mc:AlternateContent>
-      <mc:AlternateContent xmlns:mc="http://schemas.openxmlformats.org/markup-compatibility/2006">
-        <mc:Choice xmlns:a14="http://schemas.microsoft.com/office/drawing/2010/main" Requires="a14">
+      <mc:AlternateContent xmlns:mc="http://schemas.openxmlformats.org/markup-compatibility/2006" xmlns:a14="http://schemas.microsoft.com/office/drawing/2010/main">
+        <mc:Choice Requires="a14">
           <p:sp>
             <p:nvSpPr>
               <p:cNvPr id="25" name="TextBox 24">
@@ -4940,6 +4948,7 @@
               </a:bodyPr>
               <a:lstStyle/>
               <a:p>
+                <a:pPr/>
                 <a14:m>
                   <m:oMathPara xmlns:m="http://schemas.openxmlformats.org/officeDocument/2006/math">
                     <m:oMathParaPr>
@@ -4979,7 +4988,7 @@
             </p:txBody>
           </p:sp>
         </mc:Choice>
-        <mc:Fallback>
+        <mc:Fallback xmlns="">
           <p:sp>
             <p:nvSpPr>
               <p:cNvPr id="25" name="TextBox 24">
@@ -5108,8 +5117,8 @@
           </a:fontRef>
         </p:style>
       </p:cxnSp>
-      <mc:AlternateContent xmlns:mc="http://schemas.openxmlformats.org/markup-compatibility/2006">
-        <mc:Choice xmlns:a14="http://schemas.microsoft.com/office/drawing/2010/main" Requires="a14">
+      <mc:AlternateContent xmlns:mc="http://schemas.openxmlformats.org/markup-compatibility/2006" xmlns:a14="http://schemas.microsoft.com/office/drawing/2010/main">
+        <mc:Choice Requires="a14">
           <p:sp>
             <p:nvSpPr>
               <p:cNvPr id="33" name="TextBox 32">
@@ -5138,6 +5147,7 @@
               </a:bodyPr>
               <a:lstStyle/>
               <a:p>
+                <a:pPr/>
                 <a14:m>
                   <m:oMathPara xmlns:m="http://schemas.openxmlformats.org/officeDocument/2006/math">
                     <m:oMathParaPr>
@@ -5177,7 +5187,7 @@
             </p:txBody>
           </p:sp>
         </mc:Choice>
-        <mc:Fallback>
+        <mc:Fallback xmlns="">
           <p:sp>
             <p:nvSpPr>
               <p:cNvPr id="33" name="TextBox 32">
@@ -5222,8 +5232,8 @@
           </p:sp>
         </mc:Fallback>
       </mc:AlternateContent>
-      <mc:AlternateContent xmlns:mc="http://schemas.openxmlformats.org/markup-compatibility/2006">
-        <mc:Choice xmlns:a14="http://schemas.microsoft.com/office/drawing/2010/main" Requires="a14">
+      <mc:AlternateContent xmlns:mc="http://schemas.openxmlformats.org/markup-compatibility/2006" xmlns:a14="http://schemas.microsoft.com/office/drawing/2010/main">
+        <mc:Choice Requires="a14">
           <p:sp>
             <p:nvSpPr>
               <p:cNvPr id="34" name="TextBox 33">
@@ -5252,6 +5262,7 @@
               </a:bodyPr>
               <a:lstStyle/>
               <a:p>
+                <a:pPr/>
                 <a14:m>
                   <m:oMathPara xmlns:m="http://schemas.openxmlformats.org/officeDocument/2006/math">
                     <m:oMathParaPr>
@@ -5291,7 +5302,7 @@
             </p:txBody>
           </p:sp>
         </mc:Choice>
-        <mc:Fallback>
+        <mc:Fallback xmlns="">
           <p:sp>
             <p:nvSpPr>
               <p:cNvPr id="34" name="TextBox 33">
@@ -5579,7 +5590,7 @@
                 </a:pPr>
                 <a:r>
                   <a:rPr lang="en-US" dirty="0"/>
-                  <a:t> All-pass ring </a:t>
+                  <a:t> All-pass ring with no drop port</a:t>
                 </a:r>
               </a:p>
               <a:p>
@@ -6509,8 +6520,8 @@
           </a:fontRef>
         </p:style>
       </p:cxnSp>
-      <mc:AlternateContent xmlns:mc="http://schemas.openxmlformats.org/markup-compatibility/2006">
-        <mc:Choice xmlns:a14="http://schemas.microsoft.com/office/drawing/2010/main" Requires="a14">
+      <mc:AlternateContent xmlns:mc="http://schemas.openxmlformats.org/markup-compatibility/2006" xmlns:a14="http://schemas.microsoft.com/office/drawing/2010/main">
+        <mc:Choice Requires="a14">
           <p:sp>
             <p:nvSpPr>
               <p:cNvPr id="46" name="TextBox 45">
@@ -6539,6 +6550,7 @@
               </a:bodyPr>
               <a:lstStyle/>
               <a:p>
+                <a:pPr/>
                 <a14:m>
                   <m:oMathPara xmlns:m="http://schemas.openxmlformats.org/officeDocument/2006/math">
                     <m:oMathParaPr>
@@ -6559,7 +6571,7 @@
             </p:txBody>
           </p:sp>
         </mc:Choice>
-        <mc:Fallback>
+        <mc:Fallback xmlns="">
           <p:sp>
             <p:nvSpPr>
               <p:cNvPr id="46" name="TextBox 45">
@@ -6780,8 +6792,8 @@
           </a:fontRef>
         </p:style>
       </p:cxnSp>
-      <mc:AlternateContent xmlns:mc="http://schemas.openxmlformats.org/markup-compatibility/2006">
-        <mc:Choice xmlns:a14="http://schemas.microsoft.com/office/drawing/2010/main" Requires="a14">
+      <mc:AlternateContent xmlns:mc="http://schemas.openxmlformats.org/markup-compatibility/2006" xmlns:a14="http://schemas.microsoft.com/office/drawing/2010/main">
+        <mc:Choice Requires="a14">
           <p:sp>
             <p:nvSpPr>
               <p:cNvPr id="51" name="TextBox 50">
@@ -6810,6 +6822,7 @@
               </a:bodyPr>
               <a:lstStyle/>
               <a:p>
+                <a:pPr/>
                 <a14:m>
                   <m:oMathPara xmlns:m="http://schemas.openxmlformats.org/officeDocument/2006/math">
                     <m:oMathParaPr>
@@ -6830,7 +6843,7 @@
             </p:txBody>
           </p:sp>
         </mc:Choice>
-        <mc:Fallback>
+        <mc:Fallback xmlns="">
           <p:sp>
             <p:nvSpPr>
               <p:cNvPr id="51" name="TextBox 50">
@@ -7000,8 +7013,8 @@
           </a:fontRef>
         </p:style>
       </p:cxnSp>
-      <mc:AlternateContent xmlns:mc="http://schemas.openxmlformats.org/markup-compatibility/2006">
-        <mc:Choice xmlns:a14="http://schemas.microsoft.com/office/drawing/2010/main" Requires="a14">
+      <mc:AlternateContent xmlns:mc="http://schemas.openxmlformats.org/markup-compatibility/2006" xmlns:a14="http://schemas.microsoft.com/office/drawing/2010/main">
+        <mc:Choice Requires="a14">
           <p:sp>
             <p:nvSpPr>
               <p:cNvPr id="21" name="TextBox 20">
@@ -7030,6 +7043,7 @@
               </a:bodyPr>
               <a:lstStyle/>
               <a:p>
+                <a:pPr/>
                 <a14:m>
                   <m:oMathPara xmlns:m="http://schemas.openxmlformats.org/officeDocument/2006/math">
                     <m:oMathParaPr>
@@ -7050,7 +7064,7 @@
             </p:txBody>
           </p:sp>
         </mc:Choice>
-        <mc:Fallback>
+        <mc:Fallback xmlns="">
           <p:sp>
             <p:nvSpPr>
               <p:cNvPr id="21" name="TextBox 20">
@@ -7095,8 +7109,8 @@
           </p:sp>
         </mc:Fallback>
       </mc:AlternateContent>
-      <mc:AlternateContent xmlns:mc="http://schemas.openxmlformats.org/markup-compatibility/2006">
-        <mc:Choice xmlns:a14="http://schemas.microsoft.com/office/drawing/2010/main" Requires="a14">
+      <mc:AlternateContent xmlns:mc="http://schemas.openxmlformats.org/markup-compatibility/2006" xmlns:a14="http://schemas.microsoft.com/office/drawing/2010/main">
+        <mc:Choice Requires="a14">
           <p:sp>
             <p:nvSpPr>
               <p:cNvPr id="22" name="TextBox 21">
@@ -7125,6 +7139,7 @@
               </a:bodyPr>
               <a:lstStyle/>
               <a:p>
+                <a:pPr/>
                 <a14:m>
                   <m:oMathPara xmlns:m="http://schemas.openxmlformats.org/officeDocument/2006/math">
                     <m:oMathParaPr>
@@ -7145,7 +7160,7 @@
             </p:txBody>
           </p:sp>
         </mc:Choice>
-        <mc:Fallback>
+        <mc:Fallback xmlns="">
           <p:sp>
             <p:nvSpPr>
               <p:cNvPr id="22" name="TextBox 21">
@@ -7190,8 +7205,8 @@
           </p:sp>
         </mc:Fallback>
       </mc:AlternateContent>
-      <mc:AlternateContent xmlns:mc="http://schemas.openxmlformats.org/markup-compatibility/2006">
-        <mc:Choice xmlns:a14="http://schemas.microsoft.com/office/drawing/2010/main" Requires="a14">
+      <mc:AlternateContent xmlns:mc="http://schemas.openxmlformats.org/markup-compatibility/2006" xmlns:a14="http://schemas.microsoft.com/office/drawing/2010/main">
+        <mc:Choice Requires="a14">
           <p:sp>
             <p:nvSpPr>
               <p:cNvPr id="4" name="Rectangle 3">
@@ -7219,6 +7234,7 @@
               </a:bodyPr>
               <a:lstStyle/>
               <a:p>
+                <a:pPr/>
                 <a14:m>
                   <m:oMathPara xmlns:m="http://schemas.openxmlformats.org/officeDocument/2006/math">
                     <m:oMathParaPr>
@@ -7258,7 +7274,7 @@
             </p:txBody>
           </p:sp>
         </mc:Choice>
-        <mc:Fallback>
+        <mc:Fallback xmlns="">
           <p:sp>
             <p:nvSpPr>
               <p:cNvPr id="4" name="Rectangle 3">
@@ -7303,8 +7319,8 @@
           </p:sp>
         </mc:Fallback>
       </mc:AlternateContent>
-      <mc:AlternateContent xmlns:mc="http://schemas.openxmlformats.org/markup-compatibility/2006">
-        <mc:Choice xmlns:a14="http://schemas.microsoft.com/office/drawing/2010/main" Requires="a14">
+      <mc:AlternateContent xmlns:mc="http://schemas.openxmlformats.org/markup-compatibility/2006" xmlns:a14="http://schemas.microsoft.com/office/drawing/2010/main">
+        <mc:Choice Requires="a14">
           <p:sp>
             <p:nvSpPr>
               <p:cNvPr id="24" name="Rectangle 23">
@@ -7332,6 +7348,7 @@
               </a:bodyPr>
               <a:lstStyle/>
               <a:p>
+                <a:pPr/>
                 <a14:m>
                   <m:oMathPara xmlns:m="http://schemas.openxmlformats.org/officeDocument/2006/math">
                     <m:oMathParaPr>
@@ -7371,7 +7388,7 @@
             </p:txBody>
           </p:sp>
         </mc:Choice>
-        <mc:Fallback>
+        <mc:Fallback xmlns="">
           <p:sp>
             <p:nvSpPr>
               <p:cNvPr id="24" name="Rectangle 23">
@@ -7560,8 +7577,13 @@
                 </a:pPr>
                 <a:r>
                   <a:rPr lang="en-US" dirty="0"/>
-                  <a:t> Add-Drop Ring </a:t>
+                  <a:t> Add-Drop Ring, can be used as a WD-Mux/</a:t>
                 </a:r>
+                <a:r>
+                  <a:rPr lang="en-US" dirty="0" err="1"/>
+                  <a:t>Demux</a:t>
+                </a:r>
+                <a:endParaRPr lang="en-US" dirty="0"/>
               </a:p>
               <a:p>
                 <a:pPr>
@@ -8288,13 +8310,7 @@
                           <a:rPr lang="en-US" i="1">
                             <a:latin typeface="Cambria Math" panose="02040503050406030204" pitchFamily="18" charset="0"/>
                           </a:rPr>
-                          <m:t>1</m:t>
-                        </m:r>
-                        <m:r>
-                          <a:rPr lang="en-US" i="1">
-                            <a:latin typeface="Cambria Math" panose="02040503050406030204" pitchFamily="18" charset="0"/>
-                          </a:rPr>
-                          <m:t>−</m:t>
+                          <m:t>1−</m:t>
                         </m:r>
                         <m:rad>
                           <m:radPr>
@@ -9045,8 +9061,8 @@
           </a:fontRef>
         </p:style>
       </p:cxnSp>
-      <mc:AlternateContent xmlns:mc="http://schemas.openxmlformats.org/markup-compatibility/2006">
-        <mc:Choice xmlns:a14="http://schemas.microsoft.com/office/drawing/2010/main" Requires="a14">
+      <mc:AlternateContent xmlns:mc="http://schemas.openxmlformats.org/markup-compatibility/2006" xmlns:a14="http://schemas.microsoft.com/office/drawing/2010/main">
+        <mc:Choice Requires="a14">
           <p:sp>
             <p:nvSpPr>
               <p:cNvPr id="68" name="TextBox 67">
@@ -9075,6 +9091,7 @@
               </a:bodyPr>
               <a:lstStyle/>
               <a:p>
+                <a:pPr/>
                 <a14:m>
                   <m:oMathPara xmlns:m="http://schemas.openxmlformats.org/officeDocument/2006/math">
                     <m:oMathParaPr>
@@ -9095,7 +9112,7 @@
             </p:txBody>
           </p:sp>
         </mc:Choice>
-        <mc:Fallback>
+        <mc:Fallback xmlns="">
           <p:sp>
             <p:nvSpPr>
               <p:cNvPr id="68" name="TextBox 67">
@@ -9316,8 +9333,8 @@
           </a:fontRef>
         </p:style>
       </p:cxnSp>
-      <mc:AlternateContent xmlns:mc="http://schemas.openxmlformats.org/markup-compatibility/2006">
-        <mc:Choice xmlns:a14="http://schemas.microsoft.com/office/drawing/2010/main" Requires="a14">
+      <mc:AlternateContent xmlns:mc="http://schemas.openxmlformats.org/markup-compatibility/2006" xmlns:a14="http://schemas.microsoft.com/office/drawing/2010/main">
+        <mc:Choice Requires="a14">
           <p:sp>
             <p:nvSpPr>
               <p:cNvPr id="73" name="TextBox 72">
@@ -9346,6 +9363,7 @@
               </a:bodyPr>
               <a:lstStyle/>
               <a:p>
+                <a:pPr/>
                 <a14:m>
                   <m:oMathPara xmlns:m="http://schemas.openxmlformats.org/officeDocument/2006/math">
                     <m:oMathParaPr>
@@ -9366,7 +9384,7 @@
             </p:txBody>
           </p:sp>
         </mc:Choice>
-        <mc:Fallback>
+        <mc:Fallback xmlns="">
           <p:sp>
             <p:nvSpPr>
               <p:cNvPr id="73" name="TextBox 72">
@@ -9618,8 +9636,8 @@
           </a:fontRef>
         </p:style>
       </p:cxnSp>
-      <mc:AlternateContent xmlns:mc="http://schemas.openxmlformats.org/markup-compatibility/2006">
-        <mc:Choice xmlns:a14="http://schemas.microsoft.com/office/drawing/2010/main" Requires="a14">
+      <mc:AlternateContent xmlns:mc="http://schemas.openxmlformats.org/markup-compatibility/2006" xmlns:a14="http://schemas.microsoft.com/office/drawing/2010/main">
+        <mc:Choice Requires="a14">
           <p:sp>
             <p:nvSpPr>
               <p:cNvPr id="79" name="TextBox 78">
@@ -9648,6 +9666,7 @@
               </a:bodyPr>
               <a:lstStyle/>
               <a:p>
+                <a:pPr/>
                 <a14:m>
                   <m:oMathPara xmlns:m="http://schemas.openxmlformats.org/officeDocument/2006/math">
                     <m:oMathParaPr>
@@ -9687,7 +9706,7 @@
             </p:txBody>
           </p:sp>
         </mc:Choice>
-        <mc:Fallback>
+        <mc:Fallback xmlns="">
           <p:sp>
             <p:nvSpPr>
               <p:cNvPr id="79" name="TextBox 78">
@@ -9732,8 +9751,8 @@
           </p:sp>
         </mc:Fallback>
       </mc:AlternateContent>
-      <mc:AlternateContent xmlns:mc="http://schemas.openxmlformats.org/markup-compatibility/2006">
-        <mc:Choice xmlns:a14="http://schemas.microsoft.com/office/drawing/2010/main" Requires="a14">
+      <mc:AlternateContent xmlns:mc="http://schemas.openxmlformats.org/markup-compatibility/2006" xmlns:a14="http://schemas.microsoft.com/office/drawing/2010/main">
+        <mc:Choice Requires="a14">
           <p:sp>
             <p:nvSpPr>
               <p:cNvPr id="80" name="TextBox 79">
@@ -9762,6 +9781,7 @@
               </a:bodyPr>
               <a:lstStyle/>
               <a:p>
+                <a:pPr/>
                 <a14:m>
                   <m:oMathPara xmlns:m="http://schemas.openxmlformats.org/officeDocument/2006/math">
                     <m:oMathParaPr>
@@ -9801,7 +9821,7 @@
             </p:txBody>
           </p:sp>
         </mc:Choice>
-        <mc:Fallback>
+        <mc:Fallback xmlns="">
           <p:sp>
             <p:nvSpPr>
               <p:cNvPr id="80" name="TextBox 79">
@@ -9930,8 +9950,8 @@
           </a:fontRef>
         </p:style>
       </p:cxnSp>
-      <mc:AlternateContent xmlns:mc="http://schemas.openxmlformats.org/markup-compatibility/2006">
-        <mc:Choice xmlns:a14="http://schemas.microsoft.com/office/drawing/2010/main" Requires="a14">
+      <mc:AlternateContent xmlns:mc="http://schemas.openxmlformats.org/markup-compatibility/2006" xmlns:a14="http://schemas.microsoft.com/office/drawing/2010/main">
+        <mc:Choice Requires="a14">
           <p:sp>
             <p:nvSpPr>
               <p:cNvPr id="83" name="TextBox 82">
@@ -9960,6 +9980,7 @@
               </a:bodyPr>
               <a:lstStyle/>
               <a:p>
+                <a:pPr/>
                 <a14:m>
                   <m:oMathPara xmlns:m="http://schemas.openxmlformats.org/officeDocument/2006/math">
                     <m:oMathParaPr>
@@ -9999,7 +10020,7 @@
             </p:txBody>
           </p:sp>
         </mc:Choice>
-        <mc:Fallback>
+        <mc:Fallback xmlns="">
           <p:sp>
             <p:nvSpPr>
               <p:cNvPr id="83" name="TextBox 82">
@@ -10044,8 +10065,8 @@
           </p:sp>
         </mc:Fallback>
       </mc:AlternateContent>
-      <mc:AlternateContent xmlns:mc="http://schemas.openxmlformats.org/markup-compatibility/2006">
-        <mc:Choice xmlns:a14="http://schemas.microsoft.com/office/drawing/2010/main" Requires="a14">
+      <mc:AlternateContent xmlns:mc="http://schemas.openxmlformats.org/markup-compatibility/2006" xmlns:a14="http://schemas.microsoft.com/office/drawing/2010/main">
+        <mc:Choice Requires="a14">
           <p:sp>
             <p:nvSpPr>
               <p:cNvPr id="84" name="Rectangle 83">
@@ -10073,6 +10094,7 @@
               </a:bodyPr>
               <a:lstStyle/>
               <a:p>
+                <a:pPr/>
                 <a14:m>
                   <m:oMathPara xmlns:m="http://schemas.openxmlformats.org/officeDocument/2006/math">
                     <m:oMathParaPr>
@@ -10112,7 +10134,7 @@
             </p:txBody>
           </p:sp>
         </mc:Choice>
-        <mc:Fallback>
+        <mc:Fallback xmlns="">
           <p:sp>
             <p:nvSpPr>
               <p:cNvPr id="84" name="Rectangle 83">
@@ -10157,8 +10179,8 @@
           </p:sp>
         </mc:Fallback>
       </mc:AlternateContent>
-      <mc:AlternateContent xmlns:mc="http://schemas.openxmlformats.org/markup-compatibility/2006">
-        <mc:Choice xmlns:a14="http://schemas.microsoft.com/office/drawing/2010/main" Requires="a14">
+      <mc:AlternateContent xmlns:mc="http://schemas.openxmlformats.org/markup-compatibility/2006" xmlns:a14="http://schemas.microsoft.com/office/drawing/2010/main">
+        <mc:Choice Requires="a14">
           <p:sp>
             <p:nvSpPr>
               <p:cNvPr id="85" name="Rectangle 84">
@@ -10186,6 +10208,7 @@
               </a:bodyPr>
               <a:lstStyle/>
               <a:p>
+                <a:pPr/>
                 <a14:m>
                   <m:oMathPara xmlns:m="http://schemas.openxmlformats.org/officeDocument/2006/math">
                     <m:oMathParaPr>
@@ -10225,7 +10248,7 @@
             </p:txBody>
           </p:sp>
         </mc:Choice>
-        <mc:Fallback>
+        <mc:Fallback xmlns="">
           <p:sp>
             <p:nvSpPr>
               <p:cNvPr id="85" name="Rectangle 84">
@@ -10270,8 +10293,8 @@
           </p:sp>
         </mc:Fallback>
       </mc:AlternateContent>
-      <mc:AlternateContent xmlns:mc="http://schemas.openxmlformats.org/markup-compatibility/2006">
-        <mc:Choice xmlns:a14="http://schemas.microsoft.com/office/drawing/2010/main" Requires="a14">
+      <mc:AlternateContent xmlns:mc="http://schemas.openxmlformats.org/markup-compatibility/2006" xmlns:a14="http://schemas.microsoft.com/office/drawing/2010/main">
+        <mc:Choice Requires="a14">
           <p:sp>
             <p:nvSpPr>
               <p:cNvPr id="86" name="Rectangle 85">
@@ -10299,6 +10322,7 @@
               </a:bodyPr>
               <a:lstStyle/>
               <a:p>
+                <a:pPr/>
                 <a14:m>
                   <m:oMathPara xmlns:m="http://schemas.openxmlformats.org/officeDocument/2006/math">
                     <m:oMathParaPr>
@@ -10338,7 +10362,7 @@
             </p:txBody>
           </p:sp>
         </mc:Choice>
-        <mc:Fallback>
+        <mc:Fallback xmlns="">
           <p:sp>
             <p:nvSpPr>
               <p:cNvPr id="86" name="Rectangle 85">
@@ -10383,8 +10407,8 @@
           </p:sp>
         </mc:Fallback>
       </mc:AlternateContent>
-      <mc:AlternateContent xmlns:mc="http://schemas.openxmlformats.org/markup-compatibility/2006">
-        <mc:Choice xmlns:a14="http://schemas.microsoft.com/office/drawing/2010/main" Requires="a14">
+      <mc:AlternateContent xmlns:mc="http://schemas.openxmlformats.org/markup-compatibility/2006" xmlns:a14="http://schemas.microsoft.com/office/drawing/2010/main">
+        <mc:Choice Requires="a14">
           <p:sp>
             <p:nvSpPr>
               <p:cNvPr id="87" name="TextBox 86">
@@ -10413,6 +10437,7 @@
               </a:bodyPr>
               <a:lstStyle/>
               <a:p>
+                <a:pPr/>
                 <a14:m>
                   <m:oMathPara xmlns:m="http://schemas.openxmlformats.org/officeDocument/2006/math">
                     <m:oMathParaPr>
@@ -10452,7 +10477,7 @@
             </p:txBody>
           </p:sp>
         </mc:Choice>
-        <mc:Fallback>
+        <mc:Fallback xmlns="">
           <p:sp>
             <p:nvSpPr>
               <p:cNvPr id="87" name="TextBox 86">
@@ -10612,8 +10637,8 @@
           </a:p>
         </p:txBody>
       </p:sp>
-      <mc:AlternateContent xmlns:mc="http://schemas.openxmlformats.org/markup-compatibility/2006">
-        <mc:Choice xmlns:a14="http://schemas.microsoft.com/office/drawing/2010/main" Requires="a14">
+      <mc:AlternateContent xmlns:mc="http://schemas.openxmlformats.org/markup-compatibility/2006" xmlns:a14="http://schemas.microsoft.com/office/drawing/2010/main">
+        <mc:Choice Requires="a14">
           <p:sp>
             <p:nvSpPr>
               <p:cNvPr id="3" name="Content Placeholder 2">
@@ -10653,7 +10678,7 @@
                     <m:d>
                       <m:dPr>
                         <m:ctrlPr>
-                          <a:rPr lang="en-US" b="0" i="0" smtClean="0">
+                          <a:rPr lang="en-US" b="0" i="1" smtClean="0">
                             <a:latin typeface="Cambria Math" panose="02040503050406030204" pitchFamily="18" charset="0"/>
                           </a:rPr>
                         </m:ctrlPr>
@@ -10979,7 +11004,7 @@
             </p:txBody>
           </p:sp>
         </mc:Choice>
-        <mc:Fallback>
+        <mc:Fallback xmlns="">
           <p:sp>
             <p:nvSpPr>
               <p:cNvPr id="3" name="Content Placeholder 2">
@@ -11256,8 +11281,8 @@
           </a:fontRef>
         </p:style>
       </p:cxnSp>
-      <mc:AlternateContent xmlns:mc="http://schemas.openxmlformats.org/markup-compatibility/2006">
-        <mc:Choice xmlns:a14="http://schemas.microsoft.com/office/drawing/2010/main" Requires="a14">
+      <mc:AlternateContent xmlns:mc="http://schemas.openxmlformats.org/markup-compatibility/2006" xmlns:a14="http://schemas.microsoft.com/office/drawing/2010/main">
+        <mc:Choice Requires="a14">
           <p:sp>
             <p:nvSpPr>
               <p:cNvPr id="68" name="TextBox 67">
@@ -11286,6 +11311,7 @@
               </a:bodyPr>
               <a:lstStyle/>
               <a:p>
+                <a:pPr/>
                 <a14:m>
                   <m:oMathPara xmlns:m="http://schemas.openxmlformats.org/officeDocument/2006/math">
                     <m:oMathParaPr>
@@ -11306,7 +11332,7 @@
             </p:txBody>
           </p:sp>
         </mc:Choice>
-        <mc:Fallback>
+        <mc:Fallback xmlns="">
           <p:sp>
             <p:nvSpPr>
               <p:cNvPr id="68" name="TextBox 67">
@@ -11527,8 +11553,8 @@
           </a:fontRef>
         </p:style>
       </p:cxnSp>
-      <mc:AlternateContent xmlns:mc="http://schemas.openxmlformats.org/markup-compatibility/2006">
-        <mc:Choice xmlns:a14="http://schemas.microsoft.com/office/drawing/2010/main" Requires="a14">
+      <mc:AlternateContent xmlns:mc="http://schemas.openxmlformats.org/markup-compatibility/2006" xmlns:a14="http://schemas.microsoft.com/office/drawing/2010/main">
+        <mc:Choice Requires="a14">
           <p:sp>
             <p:nvSpPr>
               <p:cNvPr id="73" name="TextBox 72">
@@ -11557,6 +11583,7 @@
               </a:bodyPr>
               <a:lstStyle/>
               <a:p>
+                <a:pPr/>
                 <a14:m>
                   <m:oMathPara xmlns:m="http://schemas.openxmlformats.org/officeDocument/2006/math">
                     <m:oMathParaPr>
@@ -11577,7 +11604,7 @@
             </p:txBody>
           </p:sp>
         </mc:Choice>
-        <mc:Fallback>
+        <mc:Fallback xmlns="">
           <p:sp>
             <p:nvSpPr>
               <p:cNvPr id="73" name="TextBox 72">
@@ -11829,8 +11856,8 @@
           </a:fontRef>
         </p:style>
       </p:cxnSp>
-      <mc:AlternateContent xmlns:mc="http://schemas.openxmlformats.org/markup-compatibility/2006">
-        <mc:Choice xmlns:a14="http://schemas.microsoft.com/office/drawing/2010/main" Requires="a14">
+      <mc:AlternateContent xmlns:mc="http://schemas.openxmlformats.org/markup-compatibility/2006" xmlns:a14="http://schemas.microsoft.com/office/drawing/2010/main">
+        <mc:Choice Requires="a14">
           <p:sp>
             <p:nvSpPr>
               <p:cNvPr id="79" name="TextBox 78">
@@ -11859,6 +11886,7 @@
               </a:bodyPr>
               <a:lstStyle/>
               <a:p>
+                <a:pPr/>
                 <a14:m>
                   <m:oMathPara xmlns:m="http://schemas.openxmlformats.org/officeDocument/2006/math">
                     <m:oMathParaPr>
@@ -11898,7 +11926,7 @@
             </p:txBody>
           </p:sp>
         </mc:Choice>
-        <mc:Fallback>
+        <mc:Fallback xmlns="">
           <p:sp>
             <p:nvSpPr>
               <p:cNvPr id="79" name="TextBox 78">
@@ -11943,8 +11971,8 @@
           </p:sp>
         </mc:Fallback>
       </mc:AlternateContent>
-      <mc:AlternateContent xmlns:mc="http://schemas.openxmlformats.org/markup-compatibility/2006">
-        <mc:Choice xmlns:a14="http://schemas.microsoft.com/office/drawing/2010/main" Requires="a14">
+      <mc:AlternateContent xmlns:mc="http://schemas.openxmlformats.org/markup-compatibility/2006" xmlns:a14="http://schemas.microsoft.com/office/drawing/2010/main">
+        <mc:Choice Requires="a14">
           <p:sp>
             <p:nvSpPr>
               <p:cNvPr id="80" name="TextBox 79">
@@ -11973,6 +12001,7 @@
               </a:bodyPr>
               <a:lstStyle/>
               <a:p>
+                <a:pPr/>
                 <a14:m>
                   <m:oMathPara xmlns:m="http://schemas.openxmlformats.org/officeDocument/2006/math">
                     <m:oMathParaPr>
@@ -12012,7 +12041,7 @@
             </p:txBody>
           </p:sp>
         </mc:Choice>
-        <mc:Fallback>
+        <mc:Fallback xmlns="">
           <p:sp>
             <p:nvSpPr>
               <p:cNvPr id="80" name="TextBox 79">
@@ -12141,8 +12170,8 @@
           </a:fontRef>
         </p:style>
       </p:cxnSp>
-      <mc:AlternateContent xmlns:mc="http://schemas.openxmlformats.org/markup-compatibility/2006">
-        <mc:Choice xmlns:a14="http://schemas.microsoft.com/office/drawing/2010/main" Requires="a14">
+      <mc:AlternateContent xmlns:mc="http://schemas.openxmlformats.org/markup-compatibility/2006" xmlns:a14="http://schemas.microsoft.com/office/drawing/2010/main">
+        <mc:Choice Requires="a14">
           <p:sp>
             <p:nvSpPr>
               <p:cNvPr id="83" name="TextBox 82">
@@ -12171,6 +12200,7 @@
               </a:bodyPr>
               <a:lstStyle/>
               <a:p>
+                <a:pPr/>
                 <a14:m>
                   <m:oMathPara xmlns:m="http://schemas.openxmlformats.org/officeDocument/2006/math">
                     <m:oMathParaPr>
@@ -12210,7 +12240,7 @@
             </p:txBody>
           </p:sp>
         </mc:Choice>
-        <mc:Fallback>
+        <mc:Fallback xmlns="">
           <p:sp>
             <p:nvSpPr>
               <p:cNvPr id="83" name="TextBox 82">
@@ -12255,8 +12285,8 @@
           </p:sp>
         </mc:Fallback>
       </mc:AlternateContent>
-      <mc:AlternateContent xmlns:mc="http://schemas.openxmlformats.org/markup-compatibility/2006">
-        <mc:Choice xmlns:a14="http://schemas.microsoft.com/office/drawing/2010/main" Requires="a14">
+      <mc:AlternateContent xmlns:mc="http://schemas.openxmlformats.org/markup-compatibility/2006" xmlns:a14="http://schemas.microsoft.com/office/drawing/2010/main">
+        <mc:Choice Requires="a14">
           <p:sp>
             <p:nvSpPr>
               <p:cNvPr id="84" name="Rectangle 83">
@@ -12284,6 +12314,7 @@
               </a:bodyPr>
               <a:lstStyle/>
               <a:p>
+                <a:pPr/>
                 <a14:m>
                   <m:oMathPara xmlns:m="http://schemas.openxmlformats.org/officeDocument/2006/math">
                     <m:oMathParaPr>
@@ -12323,7 +12354,7 @@
             </p:txBody>
           </p:sp>
         </mc:Choice>
-        <mc:Fallback>
+        <mc:Fallback xmlns="">
           <p:sp>
             <p:nvSpPr>
               <p:cNvPr id="84" name="Rectangle 83">
@@ -12368,8 +12399,8 @@
           </p:sp>
         </mc:Fallback>
       </mc:AlternateContent>
-      <mc:AlternateContent xmlns:mc="http://schemas.openxmlformats.org/markup-compatibility/2006">
-        <mc:Choice xmlns:a14="http://schemas.microsoft.com/office/drawing/2010/main" Requires="a14">
+      <mc:AlternateContent xmlns:mc="http://schemas.openxmlformats.org/markup-compatibility/2006" xmlns:a14="http://schemas.microsoft.com/office/drawing/2010/main">
+        <mc:Choice Requires="a14">
           <p:sp>
             <p:nvSpPr>
               <p:cNvPr id="85" name="Rectangle 84">
@@ -12397,6 +12428,7 @@
               </a:bodyPr>
               <a:lstStyle/>
               <a:p>
+                <a:pPr/>
                 <a14:m>
                   <m:oMathPara xmlns:m="http://schemas.openxmlformats.org/officeDocument/2006/math">
                     <m:oMathParaPr>
@@ -12436,7 +12468,7 @@
             </p:txBody>
           </p:sp>
         </mc:Choice>
-        <mc:Fallback>
+        <mc:Fallback xmlns="">
           <p:sp>
             <p:nvSpPr>
               <p:cNvPr id="85" name="Rectangle 84">
@@ -12481,8 +12513,8 @@
           </p:sp>
         </mc:Fallback>
       </mc:AlternateContent>
-      <mc:AlternateContent xmlns:mc="http://schemas.openxmlformats.org/markup-compatibility/2006">
-        <mc:Choice xmlns:a14="http://schemas.microsoft.com/office/drawing/2010/main" Requires="a14">
+      <mc:AlternateContent xmlns:mc="http://schemas.openxmlformats.org/markup-compatibility/2006" xmlns:a14="http://schemas.microsoft.com/office/drawing/2010/main">
+        <mc:Choice Requires="a14">
           <p:sp>
             <p:nvSpPr>
               <p:cNvPr id="86" name="Rectangle 85">
@@ -12510,6 +12542,7 @@
               </a:bodyPr>
               <a:lstStyle/>
               <a:p>
+                <a:pPr/>
                 <a14:m>
                   <m:oMathPara xmlns:m="http://schemas.openxmlformats.org/officeDocument/2006/math">
                     <m:oMathParaPr>
@@ -12549,7 +12582,7 @@
             </p:txBody>
           </p:sp>
         </mc:Choice>
-        <mc:Fallback>
+        <mc:Fallback xmlns="">
           <p:sp>
             <p:nvSpPr>
               <p:cNvPr id="86" name="Rectangle 85">
@@ -12594,8 +12627,8 @@
           </p:sp>
         </mc:Fallback>
       </mc:AlternateContent>
-      <mc:AlternateContent xmlns:mc="http://schemas.openxmlformats.org/markup-compatibility/2006">
-        <mc:Choice xmlns:a14="http://schemas.microsoft.com/office/drawing/2010/main" Requires="a14">
+      <mc:AlternateContent xmlns:mc="http://schemas.openxmlformats.org/markup-compatibility/2006" xmlns:a14="http://schemas.microsoft.com/office/drawing/2010/main">
+        <mc:Choice Requires="a14">
           <p:sp>
             <p:nvSpPr>
               <p:cNvPr id="29" name="TextBox 28">
@@ -12624,6 +12657,7 @@
               </a:bodyPr>
               <a:lstStyle/>
               <a:p>
+                <a:pPr/>
                 <a14:m>
                   <m:oMathPara xmlns:m="http://schemas.openxmlformats.org/officeDocument/2006/math">
                     <m:oMathParaPr>
@@ -12663,7 +12697,7 @@
             </p:txBody>
           </p:sp>
         </mc:Choice>
-        <mc:Fallback>
+        <mc:Fallback xmlns="">
           <p:sp>
             <p:nvSpPr>
               <p:cNvPr id="29" name="TextBox 28">

</xml_diff>

<commit_message>
rings update with project base example
added project base
</commit_message>
<xml_diff>
--- a/SiEPIC_Photonics_Package/solvers_simulators/rings/Design of Critically Coupled Microring Resonators.pptx
+++ b/SiEPIC_Photonics_Package/solvers_simulators/rings/Design of Critically Coupled Microring Resonators.pptx
@@ -342,7 +342,7 @@
           <a:p>
             <a:fld id="{FADC9871-791D-4886-AEB8-61B2D1DCF1D4}" type="datetimeFigureOut">
               <a:rPr lang="en-US" smtClean="0"/>
-              <a:t>9/5/2020</a:t>
+              <a:t>9/8/2020</a:t>
             </a:fld>
             <a:endParaRPr lang="en-US"/>
           </a:p>
@@ -550,7 +550,7 @@
           <a:p>
             <a:fld id="{FADC9871-791D-4886-AEB8-61B2D1DCF1D4}" type="datetimeFigureOut">
               <a:rPr lang="en-US" smtClean="0"/>
-              <a:t>9/5/2020</a:t>
+              <a:t>9/8/2020</a:t>
             </a:fld>
             <a:endParaRPr lang="en-US"/>
           </a:p>
@@ -806,7 +806,7 @@
           <a:p>
             <a:fld id="{FADC9871-791D-4886-AEB8-61B2D1DCF1D4}" type="datetimeFigureOut">
               <a:rPr lang="en-US" smtClean="0"/>
-              <a:t>9/5/2020</a:t>
+              <a:t>9/8/2020</a:t>
             </a:fld>
             <a:endParaRPr lang="en-US"/>
           </a:p>
@@ -976,7 +976,7 @@
           <a:p>
             <a:fld id="{FADC9871-791D-4886-AEB8-61B2D1DCF1D4}" type="datetimeFigureOut">
               <a:rPr lang="en-US" smtClean="0"/>
-              <a:t>9/5/2020</a:t>
+              <a:t>9/8/2020</a:t>
             </a:fld>
             <a:endParaRPr lang="en-US"/>
           </a:p>
@@ -1319,7 +1319,7 @@
           <a:p>
             <a:fld id="{FADC9871-791D-4886-AEB8-61B2D1DCF1D4}" type="datetimeFigureOut">
               <a:rPr lang="en-US" smtClean="0"/>
-              <a:t>9/5/2020</a:t>
+              <a:t>9/8/2020</a:t>
             </a:fld>
             <a:endParaRPr lang="en-US"/>
           </a:p>
@@ -1594,7 +1594,7 @@
           <a:p>
             <a:fld id="{FADC9871-791D-4886-AEB8-61B2D1DCF1D4}" type="datetimeFigureOut">
               <a:rPr lang="en-US" smtClean="0"/>
-              <a:t>9/5/2020</a:t>
+              <a:t>9/8/2020</a:t>
             </a:fld>
             <a:endParaRPr lang="en-US"/>
           </a:p>
@@ -1973,7 +1973,7 @@
           <a:p>
             <a:fld id="{FADC9871-791D-4886-AEB8-61B2D1DCF1D4}" type="datetimeFigureOut">
               <a:rPr lang="en-US" smtClean="0"/>
-              <a:t>9/5/2020</a:t>
+              <a:t>9/8/2020</a:t>
             </a:fld>
             <a:endParaRPr lang="en-US"/>
           </a:p>
@@ -2091,7 +2091,7 @@
           <a:p>
             <a:fld id="{FADC9871-791D-4886-AEB8-61B2D1DCF1D4}" type="datetimeFigureOut">
               <a:rPr lang="en-US" smtClean="0"/>
-              <a:t>9/5/2020</a:t>
+              <a:t>9/8/2020</a:t>
             </a:fld>
             <a:endParaRPr lang="en-US"/>
           </a:p>
@@ -2262,7 +2262,7 @@
           <a:p>
             <a:fld id="{FADC9871-791D-4886-AEB8-61B2D1DCF1D4}" type="datetimeFigureOut">
               <a:rPr lang="en-US" smtClean="0"/>
-              <a:t>9/5/2020</a:t>
+              <a:t>9/8/2020</a:t>
             </a:fld>
             <a:endParaRPr lang="en-US"/>
           </a:p>
@@ -2616,7 +2616,7 @@
           <a:p>
             <a:fld id="{FADC9871-791D-4886-AEB8-61B2D1DCF1D4}" type="datetimeFigureOut">
               <a:rPr lang="en-US" smtClean="0"/>
-              <a:t>9/5/2020</a:t>
+              <a:t>9/8/2020</a:t>
             </a:fld>
             <a:endParaRPr lang="en-US"/>
           </a:p>
@@ -2993,7 +2993,7 @@
           <a:p>
             <a:fld id="{FADC9871-791D-4886-AEB8-61B2D1DCF1D4}" type="datetimeFigureOut">
               <a:rPr lang="en-US" smtClean="0"/>
-              <a:t>9/5/2020</a:t>
+              <a:t>9/8/2020</a:t>
             </a:fld>
             <a:endParaRPr lang="en-US"/>
           </a:p>
@@ -3280,7 +3280,7 @@
           <a:p>
             <a:fld id="{FADC9871-791D-4886-AEB8-61B2D1DCF1D4}" type="datetimeFigureOut">
               <a:rPr lang="en-US" smtClean="0"/>
-              <a:t>9/5/2020</a:t>
+              <a:t>9/8/2020</a:t>
             </a:fld>
             <a:endParaRPr lang="en-US"/>
           </a:p>
@@ -3871,7 +3871,7 @@
           <a:p>
             <a:r>
               <a:rPr lang="en-US" dirty="0"/>
-              <a:t>20200904</a:t>
+              <a:t>2020</a:t>
             </a:r>
           </a:p>
         </p:txBody>
@@ -5561,8 +5561,8 @@
           </a:p>
         </p:txBody>
       </p:sp>
-      <mc:AlternateContent xmlns:mc="http://schemas.openxmlformats.org/markup-compatibility/2006">
-        <mc:Choice xmlns:a14="http://schemas.microsoft.com/office/drawing/2010/main" Requires="a14">
+      <mc:AlternateContent xmlns:mc="http://schemas.openxmlformats.org/markup-compatibility/2006" xmlns:a14="http://schemas.microsoft.com/office/drawing/2010/main">
+        <mc:Choice Requires="a14">
           <p:sp>
             <p:nvSpPr>
               <p:cNvPr id="3" name="Content Placeholder 2">
@@ -6293,7 +6293,7 @@
             </p:txBody>
           </p:sp>
         </mc:Choice>
-        <mc:Fallback>
+        <mc:Fallback xmlns="">
           <p:sp>
             <p:nvSpPr>
               <p:cNvPr id="3" name="Content Placeholder 2">
@@ -7548,8 +7548,8 @@
           </a:p>
         </p:txBody>
       </p:sp>
-      <mc:AlternateContent xmlns:mc="http://schemas.openxmlformats.org/markup-compatibility/2006">
-        <mc:Choice xmlns:a14="http://schemas.microsoft.com/office/drawing/2010/main" Requires="a14">
+      <mc:AlternateContent xmlns:mc="http://schemas.openxmlformats.org/markup-compatibility/2006" xmlns:a14="http://schemas.microsoft.com/office/drawing/2010/main">
+        <mc:Choice Requires="a14">
           <p:sp>
             <p:nvSpPr>
               <p:cNvPr id="3" name="Content Placeholder 2">
@@ -8788,7 +8788,7 @@
             </p:txBody>
           </p:sp>
         </mc:Choice>
-        <mc:Fallback>
+        <mc:Fallback xmlns="">
           <p:sp>
             <p:nvSpPr>
               <p:cNvPr id="3" name="Content Placeholder 2">
@@ -10637,8 +10637,8 @@
           </a:p>
         </p:txBody>
       </p:sp>
-      <mc:AlternateContent xmlns:mc="http://schemas.openxmlformats.org/markup-compatibility/2006" xmlns:a14="http://schemas.microsoft.com/office/drawing/2010/main">
-        <mc:Choice Requires="a14">
+      <mc:AlternateContent xmlns:mc="http://schemas.openxmlformats.org/markup-compatibility/2006">
+        <mc:Choice xmlns:a14="http://schemas.microsoft.com/office/drawing/2010/main" Requires="a14">
           <p:sp>
             <p:nvSpPr>
               <p:cNvPr id="3" name="Content Placeholder 2">
@@ -10995,16 +10995,145 @@
                 </a:r>
               </a:p>
               <a:p>
-                <a:pPr lvl="2">
+                <a:pPr lvl="3">
                   <a:buFont typeface="Arial" panose="020B0604020202020204" pitchFamily="34" charset="0"/>
                   <a:buChar char="•"/>
                 </a:pPr>
+                <a14:m>
+                  <m:oMath xmlns:m="http://schemas.openxmlformats.org/officeDocument/2006/math">
+                    <m:r>
+                      <a:rPr lang="en-US" i="1">
+                        <a:latin typeface="Cambria Math" panose="02040503050406030204" pitchFamily="18" charset="0"/>
+                      </a:rPr>
+                      <m:t>𝛼</m:t>
+                    </m:r>
+                  </m:oMath>
+                </a14:m>
+                <a:r>
+                  <a:rPr lang="en-US" b="0" dirty="0"/>
+                  <a:t> [1/cm]  </a:t>
+                </a:r>
+                <a14:m>
+                  <m:oMath xmlns:m="http://schemas.openxmlformats.org/officeDocument/2006/math">
+                    <m:r>
+                      <a:rPr lang="en-US" b="0" i="1" smtClean="0">
+                        <a:latin typeface="Cambria Math" panose="02040503050406030204" pitchFamily="18" charset="0"/>
+                      </a:rPr>
+                      <m:t>=</m:t>
+                    </m:r>
+                    <m:sSup>
+                      <m:sSupPr>
+                        <m:ctrlPr>
+                          <a:rPr lang="en-US" b="0" i="1" smtClean="0">
+                            <a:latin typeface="Cambria Math" panose="02040503050406030204" pitchFamily="18" charset="0"/>
+                          </a:rPr>
+                        </m:ctrlPr>
+                      </m:sSupPr>
+                      <m:e>
+                        <m:r>
+                          <a:rPr lang="en-US" b="0" i="1" smtClean="0">
+                            <a:latin typeface="Cambria Math" panose="02040503050406030204" pitchFamily="18" charset="0"/>
+                          </a:rPr>
+                          <m:t>10</m:t>
+                        </m:r>
+                      </m:e>
+                      <m:sup>
+                        <m:r>
+                          <a:rPr lang="en-US" b="0" i="1" smtClean="0">
+                            <a:latin typeface="Cambria Math" panose="02040503050406030204" pitchFamily="18" charset="0"/>
+                          </a:rPr>
+                          <m:t>−</m:t>
+                        </m:r>
+                        <m:f>
+                          <m:fPr>
+                            <m:ctrlPr>
+                              <a:rPr lang="en-US" b="0" i="1" smtClean="0">
+                                <a:latin typeface="Cambria Math" panose="02040503050406030204" pitchFamily="18" charset="0"/>
+                              </a:rPr>
+                            </m:ctrlPr>
+                          </m:fPr>
+                          <m:num>
+                            <m:d>
+                              <m:dPr>
+                                <m:ctrlPr>
+                                  <a:rPr lang="en-US" b="0" i="1" smtClean="0">
+                                    <a:latin typeface="Cambria Math" panose="02040503050406030204" pitchFamily="18" charset="0"/>
+                                  </a:rPr>
+                                </m:ctrlPr>
+                              </m:dPr>
+                              <m:e>
+                                <m:r>
+                                  <a:rPr lang="en-US" b="0" i="1" smtClean="0">
+                                    <a:latin typeface="Cambria Math" panose="02040503050406030204" pitchFamily="18" charset="0"/>
+                                  </a:rPr>
+                                  <m:t>𝛼</m:t>
+                                </m:r>
+                                <m:r>
+                                  <a:rPr lang="en-US" b="0" i="1" smtClean="0">
+                                    <a:latin typeface="Cambria Math" panose="02040503050406030204" pitchFamily="18" charset="0"/>
+                                  </a:rPr>
+                                  <m:t> </m:t>
+                                </m:r>
+                                <m:d>
+                                  <m:dPr>
+                                    <m:begChr m:val="["/>
+                                    <m:endChr m:val="]"/>
+                                    <m:ctrlPr>
+                                      <a:rPr lang="en-US" b="0" i="1" smtClean="0">
+                                        <a:latin typeface="Cambria Math" panose="02040503050406030204" pitchFamily="18" charset="0"/>
+                                      </a:rPr>
+                                    </m:ctrlPr>
+                                  </m:dPr>
+                                  <m:e>
+                                    <m:f>
+                                      <m:fPr>
+                                        <m:ctrlPr>
+                                          <a:rPr lang="en-US" b="0" i="1" smtClean="0">
+                                            <a:latin typeface="Cambria Math" panose="02040503050406030204" pitchFamily="18" charset="0"/>
+                                          </a:rPr>
+                                        </m:ctrlPr>
+                                      </m:fPr>
+                                      <m:num>
+                                        <m:r>
+                                          <a:rPr lang="en-US" b="0" i="1" smtClean="0">
+                                            <a:latin typeface="Cambria Math" panose="02040503050406030204" pitchFamily="18" charset="0"/>
+                                          </a:rPr>
+                                          <m:t>𝑑𝐵</m:t>
+                                        </m:r>
+                                      </m:num>
+                                      <m:den>
+                                        <m:r>
+                                          <a:rPr lang="en-US" b="0" i="1" smtClean="0">
+                                            <a:latin typeface="Cambria Math" panose="02040503050406030204" pitchFamily="18" charset="0"/>
+                                          </a:rPr>
+                                          <m:t>𝑐𝑚</m:t>
+                                        </m:r>
+                                      </m:den>
+                                    </m:f>
+                                  </m:e>
+                                </m:d>
+                              </m:e>
+                            </m:d>
+                          </m:num>
+                          <m:den>
+                            <m:r>
+                              <a:rPr lang="en-US" b="0" i="1" smtClean="0">
+                                <a:latin typeface="Cambria Math" panose="02040503050406030204" pitchFamily="18" charset="0"/>
+                              </a:rPr>
+                              <m:t>10</m:t>
+                            </m:r>
+                          </m:den>
+                        </m:f>
+                      </m:sup>
+                    </m:sSup>
+                  </m:oMath>
+                </a14:m>
                 <a:endParaRPr lang="en-US" dirty="0"/>
               </a:p>
             </p:txBody>
           </p:sp>
         </mc:Choice>
-        <mc:Fallback xmlns="">
+        <mc:Fallback>
           <p:sp>
             <p:nvSpPr>
               <p:cNvPr id="3" name="Content Placeholder 2">

</xml_diff>